<commit_message>
Added files for the DOM and started advanced
</commit_message>
<xml_diff>
--- a/Bootcamp/javascript-uvod/javascript-uvod.pptx
+++ b/Bootcamp/javascript-uvod/javascript-uvod.pptx
@@ -5,7 +5,7 @@
     <p:sldMasterId id="2147483648" r:id="rId4"/>
   </p:sldMasterIdLst>
   <p:notesMasterIdLst>
-    <p:notesMasterId r:id="rId40"/>
+    <p:notesMasterId r:id="rId41"/>
   </p:notesMasterIdLst>
   <p:sldIdLst>
     <p:sldId id="282" r:id="rId5"/>
@@ -42,7 +42,8 @@
     <p:sldId id="374" r:id="rId36"/>
     <p:sldId id="375" r:id="rId37"/>
     <p:sldId id="376" r:id="rId38"/>
-    <p:sldId id="381" r:id="rId39"/>
+    <p:sldId id="382" r:id="rId39"/>
+    <p:sldId id="383" r:id="rId40"/>
   </p:sldIdLst>
   <p:sldSz cx="12192000" cy="6858000"/>
   <p:notesSz cx="6858000" cy="9144000"/>
@@ -184,7 +185,8 @@
             <p14:sldId id="374"/>
             <p14:sldId id="375"/>
             <p14:sldId id="376"/>
-            <p14:sldId id="381"/>
+            <p14:sldId id="382"/>
+            <p14:sldId id="383"/>
           </p14:sldIdLst>
         </p14:section>
       </p14:sectionLst>
@@ -289,7 +291,7 @@
           <a:p>
             <a:fld id="{B2A70591-2E3C-5F42-A4E1-C0F5A0F4E5DB}" type="datetimeFigureOut">
               <a:rPr lang="en-US" smtClean="0"/>
-              <a:t>4/30/2025</a:t>
+              <a:t>5/12/2025</a:t>
             </a:fld>
             <a:endParaRPr lang="en-US"/>
           </a:p>
@@ -3750,7 +3752,13 @@
   <p:cSld>
     <p:spTree>
       <p:nvGrpSpPr>
-        <p:cNvPr id="1" name=""/>
+        <p:cNvPr id="1" name="">
+          <a:extLst>
+            <a:ext uri="{FF2B5EF4-FFF2-40B4-BE49-F238E27FC236}">
+              <a16:creationId xmlns:a16="http://schemas.microsoft.com/office/drawing/2014/main" id="{F93B3166-2331-F359-FE1C-0DCD50CA6809}"/>
+            </a:ext>
+          </a:extLst>
+        </p:cNvPr>
         <p:cNvGrpSpPr/>
         <p:nvPr/>
       </p:nvGrpSpPr>
@@ -3764,7 +3772,13 @@
       </p:grpSpPr>
       <p:sp>
         <p:nvSpPr>
-          <p:cNvPr id="2" name="Slide Image Placeholder 1"/>
+          <p:cNvPr id="2" name="Slide Image Placeholder 1">
+            <a:extLst>
+              <a:ext uri="{FF2B5EF4-FFF2-40B4-BE49-F238E27FC236}">
+                <a16:creationId xmlns:a16="http://schemas.microsoft.com/office/drawing/2014/main" id="{64C5F5F6-7E36-F817-B99C-095EA9752DAB}"/>
+              </a:ext>
+            </a:extLst>
+          </p:cNvPr>
           <p:cNvSpPr>
             <a:spLocks noGrp="1" noRot="1" noChangeAspect="1"/>
           </p:cNvSpPr>
@@ -3776,7 +3790,13 @@
       </p:sp>
       <p:sp>
         <p:nvSpPr>
-          <p:cNvPr id="3" name="Notes Placeholder 2"/>
+          <p:cNvPr id="3" name="Notes Placeholder 2">
+            <a:extLst>
+              <a:ext uri="{FF2B5EF4-FFF2-40B4-BE49-F238E27FC236}">
+                <a16:creationId xmlns:a16="http://schemas.microsoft.com/office/drawing/2014/main" id="{9D08AD06-0871-F396-73AC-827D5E34A624}"/>
+              </a:ext>
+            </a:extLst>
+          </p:cNvPr>
           <p:cNvSpPr>
             <a:spLocks noGrp="1"/>
           </p:cNvSpPr>
@@ -3795,7 +3815,13 @@
       </p:sp>
       <p:sp>
         <p:nvSpPr>
-          <p:cNvPr id="4" name="Slide Number Placeholder 3"/>
+          <p:cNvPr id="4" name="Slide Number Placeholder 3">
+            <a:extLst>
+              <a:ext uri="{FF2B5EF4-FFF2-40B4-BE49-F238E27FC236}">
+                <a16:creationId xmlns:a16="http://schemas.microsoft.com/office/drawing/2014/main" id="{39F5D908-A356-949A-AC22-AFC5E5D95789}"/>
+              </a:ext>
+            </a:extLst>
+          </p:cNvPr>
           <p:cNvSpPr>
             <a:spLocks noGrp="1"/>
           </p:cNvSpPr>
@@ -3819,7 +3845,115 @@
     </p:spTree>
     <p:extLst>
       <p:ext uri="{BB962C8B-B14F-4D97-AF65-F5344CB8AC3E}">
-        <p14:creationId xmlns:p14="http://schemas.microsoft.com/office/powerpoint/2010/main" val="2175340841"/>
+        <p14:creationId xmlns:p14="http://schemas.microsoft.com/office/powerpoint/2010/main" val="3162088856"/>
+      </p:ext>
+    </p:extLst>
+  </p:cSld>
+  <p:clrMapOvr>
+    <a:masterClrMapping/>
+  </p:clrMapOvr>
+</p:notes>
+</file>
+
+<file path=ppt/notesSlides/notesSlide35.xml><?xml version="1.0" encoding="utf-8"?>
+<p:notes xmlns:a="http://schemas.openxmlformats.org/drawingml/2006/main" xmlns:r="http://schemas.openxmlformats.org/officeDocument/2006/relationships" xmlns:p="http://schemas.openxmlformats.org/presentationml/2006/main">
+  <p:cSld>
+    <p:spTree>
+      <p:nvGrpSpPr>
+        <p:cNvPr id="1" name="">
+          <a:extLst>
+            <a:ext uri="{FF2B5EF4-FFF2-40B4-BE49-F238E27FC236}">
+              <a16:creationId xmlns:a16="http://schemas.microsoft.com/office/drawing/2014/main" id="{2AF6D0A0-5F45-AA25-6575-6829FA06F1D3}"/>
+            </a:ext>
+          </a:extLst>
+        </p:cNvPr>
+        <p:cNvGrpSpPr/>
+        <p:nvPr/>
+      </p:nvGrpSpPr>
+      <p:grpSpPr>
+        <a:xfrm>
+          <a:off x="0" y="0"/>
+          <a:ext cx="0" cy="0"/>
+          <a:chOff x="0" y="0"/>
+          <a:chExt cx="0" cy="0"/>
+        </a:xfrm>
+      </p:grpSpPr>
+      <p:sp>
+        <p:nvSpPr>
+          <p:cNvPr id="2" name="Slide Image Placeholder 1">
+            <a:extLst>
+              <a:ext uri="{FF2B5EF4-FFF2-40B4-BE49-F238E27FC236}">
+                <a16:creationId xmlns:a16="http://schemas.microsoft.com/office/drawing/2014/main" id="{D0DEA985-AF59-128F-A67F-BCB8D678B9C9}"/>
+              </a:ext>
+            </a:extLst>
+          </p:cNvPr>
+          <p:cNvSpPr>
+            <a:spLocks noGrp="1" noRot="1" noChangeAspect="1"/>
+          </p:cNvSpPr>
+          <p:nvPr>
+            <p:ph type="sldImg"/>
+          </p:nvPr>
+        </p:nvSpPr>
+        <p:spPr/>
+      </p:sp>
+      <p:sp>
+        <p:nvSpPr>
+          <p:cNvPr id="3" name="Notes Placeholder 2">
+            <a:extLst>
+              <a:ext uri="{FF2B5EF4-FFF2-40B4-BE49-F238E27FC236}">
+                <a16:creationId xmlns:a16="http://schemas.microsoft.com/office/drawing/2014/main" id="{0C2E91E5-22D2-6D9F-1688-898AB2F04F6C}"/>
+              </a:ext>
+            </a:extLst>
+          </p:cNvPr>
+          <p:cNvSpPr>
+            <a:spLocks noGrp="1"/>
+          </p:cNvSpPr>
+          <p:nvPr>
+            <p:ph type="body" idx="1"/>
+          </p:nvPr>
+        </p:nvSpPr>
+        <p:spPr/>
+        <p:txBody>
+          <a:bodyPr/>
+          <a:lstStyle/>
+          <a:p>
+            <a:endParaRPr lang="hr-HR" dirty="0"/>
+          </a:p>
+        </p:txBody>
+      </p:sp>
+      <p:sp>
+        <p:nvSpPr>
+          <p:cNvPr id="4" name="Slide Number Placeholder 3">
+            <a:extLst>
+              <a:ext uri="{FF2B5EF4-FFF2-40B4-BE49-F238E27FC236}">
+                <a16:creationId xmlns:a16="http://schemas.microsoft.com/office/drawing/2014/main" id="{019C6249-6320-C59F-8206-BD976AFE30B8}"/>
+              </a:ext>
+            </a:extLst>
+          </p:cNvPr>
+          <p:cNvSpPr>
+            <a:spLocks noGrp="1"/>
+          </p:cNvSpPr>
+          <p:nvPr>
+            <p:ph type="sldNum" sz="quarter" idx="5"/>
+          </p:nvPr>
+        </p:nvSpPr>
+        <p:spPr/>
+        <p:txBody>
+          <a:bodyPr/>
+          <a:lstStyle/>
+          <a:p>
+            <a:fld id="{343B951A-A665-1949-AEDB-B62DC9BE7F13}" type="slidenum">
+              <a:rPr lang="en-US" smtClean="0"/>
+              <a:t>36</a:t>
+            </a:fld>
+            <a:endParaRPr lang="en-US"/>
+          </a:p>
+        </p:txBody>
+      </p:sp>
+    </p:spTree>
+    <p:extLst>
+      <p:ext uri="{BB962C8B-B14F-4D97-AF65-F5344CB8AC3E}">
+        <p14:creationId xmlns:p14="http://schemas.microsoft.com/office/powerpoint/2010/main" val="4098519256"/>
       </p:ext>
     </p:extLst>
   </p:cSld>
@@ -5169,7 +5303,7 @@
                 <a:ea typeface="Open Sans" panose="020B0606030504020204" pitchFamily="34" charset="0"/>
                 <a:cs typeface="Open Sans" panose="020B0606030504020204" pitchFamily="34" charset="0"/>
               </a:rPr>
-              <a:t>30/04/2025</a:t>
+              <a:t>12/05/2025</a:t>
             </a:fld>
             <a:endParaRPr lang="en-GB" sz="1800" b="0" i="0" kern="1200" dirty="0">
               <a:solidFill>
@@ -5914,7 +6048,7 @@
                 <a:ea typeface="Open Sans" panose="020B0606030504020204" pitchFamily="34" charset="0"/>
                 <a:cs typeface="Open Sans" panose="020B0606030504020204" pitchFamily="34" charset="0"/>
               </a:rPr>
-              <a:t>30/04/2025</a:t>
+              <a:t>12/05/2025</a:t>
             </a:fld>
             <a:endParaRPr lang="en-GB" sz="1800" b="0" i="0" kern="1200" dirty="0">
               <a:solidFill>
@@ -6437,7 +6571,7 @@
                 <a:ea typeface="Open Sans" panose="020B0606030504020204" pitchFamily="34" charset="0"/>
                 <a:cs typeface="Open Sans" panose="020B0606030504020204" pitchFamily="34" charset="0"/>
               </a:rPr>
-              <a:t>30/04/2025</a:t>
+              <a:t>12/05/2025</a:t>
             </a:fld>
             <a:endParaRPr lang="en-GB" sz="1800" b="0" i="0" kern="1200" dirty="0">
               <a:solidFill>
@@ -7403,7 +7537,7 @@
                 <a:ea typeface="Open Sans" panose="020B0606030504020204" pitchFamily="34" charset="0"/>
                 <a:cs typeface="Open Sans" panose="020B0606030504020204" pitchFamily="34" charset="0"/>
               </a:rPr>
-              <a:t>30/04/2025</a:t>
+              <a:t>12/05/2025</a:t>
             </a:fld>
             <a:endParaRPr lang="en-GB" sz="1800" b="0" i="0" kern="1200" dirty="0">
               <a:solidFill>
@@ -7842,7 +7976,7 @@
                 <a:ea typeface="Open Sans" panose="020B0606030504020204" pitchFamily="34" charset="0"/>
                 <a:cs typeface="Open Sans" panose="020B0606030504020204" pitchFamily="34" charset="0"/>
               </a:rPr>
-              <a:t>30/04/2025</a:t>
+              <a:t>12/05/2025</a:t>
             </a:fld>
             <a:endParaRPr lang="en-GB" sz="1800" b="0" i="0" kern="1200" dirty="0">
               <a:solidFill>
@@ -9612,7 +9746,7 @@
                 <a:ea typeface="Open Sans" pitchFamily="2" charset="0"/>
                 <a:cs typeface="Open Sans" pitchFamily="2" charset="0"/>
               </a:rPr>
-              <a:t>30/04/2025</a:t>
+              <a:t>12/05/2025</a:t>
             </a:fld>
             <a:endParaRPr lang="en-GB" sz="1800" b="0" i="0" kern="1200" dirty="0">
               <a:solidFill>
@@ -11362,7 +11496,7 @@
                 <a:ea typeface="Open Sans" pitchFamily="2" charset="0"/>
                 <a:cs typeface="Open Sans" pitchFamily="2" charset="0"/>
               </a:rPr>
-              <a:t>30/04/2025</a:t>
+              <a:t>12/05/2025</a:t>
             </a:fld>
             <a:endParaRPr lang="en-GB" sz="1800" b="0" i="0" kern="1200" dirty="0">
               <a:solidFill>
@@ -11879,7 +12013,7 @@
                 <a:ea typeface="Open Sans" panose="020B0606030504020204" pitchFamily="34" charset="0"/>
                 <a:cs typeface="Open Sans" panose="020B0606030504020204" pitchFamily="34" charset="0"/>
               </a:rPr>
-              <a:t>30/04/2025</a:t>
+              <a:t>12/05/2025</a:t>
             </a:fld>
             <a:endParaRPr lang="en-GB" sz="1800" b="0" i="0" kern="1200" dirty="0">
               <a:solidFill>
@@ -12476,7 +12610,7 @@
                 <a:ea typeface="Open Sans" pitchFamily="2" charset="0"/>
                 <a:cs typeface="Open Sans" pitchFamily="2" charset="0"/>
               </a:rPr>
-              <a:t>30/04/2025</a:t>
+              <a:t>12/05/2025</a:t>
             </a:fld>
             <a:endParaRPr lang="en-GB" sz="1800" b="0" i="0" kern="1200" dirty="0">
               <a:solidFill>
@@ -13016,7 +13150,7 @@
                 <a:ea typeface="Open Sans" panose="020B0606030504020204" pitchFamily="34" charset="0"/>
                 <a:cs typeface="Open Sans" panose="020B0606030504020204" pitchFamily="34" charset="0"/>
               </a:rPr>
-              <a:t>30/04/2025</a:t>
+              <a:t>12/05/2025</a:t>
             </a:fld>
             <a:endParaRPr lang="en-GB" sz="1800" b="0" i="0" kern="1200" dirty="0">
               <a:solidFill>
@@ -13717,7 +13851,7 @@
                 <a:ea typeface="Open Sans" panose="020B0606030504020204" pitchFamily="34" charset="0"/>
                 <a:cs typeface="Open Sans" panose="020B0606030504020204" pitchFamily="34" charset="0"/>
               </a:rPr>
-              <a:t>30/04/2025</a:t>
+              <a:t>12/05/2025</a:t>
             </a:fld>
             <a:endParaRPr lang="en-GB" sz="1800" b="0" i="0" kern="1200" dirty="0">
               <a:solidFill>
@@ -14080,7 +14214,7 @@
                 <a:ea typeface="Open Sans" pitchFamily="2" charset="0"/>
                 <a:cs typeface="Open Sans" pitchFamily="2" charset="0"/>
               </a:rPr>
-              <a:t>30/04/2025</a:t>
+              <a:t>12/05/2025</a:t>
             </a:fld>
             <a:endParaRPr lang="en-GB" sz="1800" b="0" i="0" kern="1200" dirty="0">
               <a:solidFill>
@@ -14475,7 +14609,7 @@
                 <a:ea typeface="Open Sans" pitchFamily="2" charset="0"/>
                 <a:cs typeface="Open Sans" pitchFamily="2" charset="0"/>
               </a:rPr>
-              <a:t>30/04/2025</a:t>
+              <a:t>12/05/2025</a:t>
             </a:fld>
             <a:endParaRPr lang="en-GB" sz="1800" b="0" i="0" kern="1200" dirty="0">
               <a:solidFill>
@@ -23395,16 +23529,20 @@
               <a:t>✔ Napraviti funkciju </a:t>
             </a:r>
             <a:r>
-              <a:rPr lang="hr-HR" sz="1400" b="1" dirty="0" err="1"/>
-              <a:t>beer</a:t>
-            </a:r>
-            <a:r>
               <a:rPr lang="hr-HR" sz="1400" b="1" dirty="0"/>
-              <a:t>()</a:t>
-            </a:r>
-            <a:r>
-              <a:rPr lang="hr-HR" sz="1400" dirty="0"/>
-              <a:t>.</a:t>
+              <a:t>beer()</a:t>
+            </a:r>
+            <a:r>
+              <a:rPr lang="en-US" sz="1400" b="1" dirty="0"/>
+              <a:t> u </a:t>
+            </a:r>
+            <a:r>
+              <a:rPr lang="en-US" sz="1400" b="1" dirty="0" err="1"/>
+              <a:t>kojoj</a:t>
+            </a:r>
+            <a:r>
+              <a:rPr lang="en-US" sz="1400" b="1" dirty="0"/>
+              <a:t>:</a:t>
             </a:r>
             <a:endParaRPr lang="en-US" sz="1400" dirty="0"/>
           </a:p>
@@ -23516,8 +23654,38 @@
         </p:blipFill>
         <p:spPr>
           <a:xfrm>
-            <a:off x="6742306" y="3405914"/>
+            <a:off x="6742306" y="3047099"/>
             <a:ext cx="5145945" cy="1625580"/>
+          </a:xfrm>
+          <a:prstGeom prst="rect">
+            <a:avLst/>
+          </a:prstGeom>
+        </p:spPr>
+      </p:pic>
+      <p:pic>
+        <p:nvPicPr>
+          <p:cNvPr id="3" name="Picture 2">
+            <a:extLst>
+              <a:ext uri="{FF2B5EF4-FFF2-40B4-BE49-F238E27FC236}">
+                <a16:creationId xmlns:a16="http://schemas.microsoft.com/office/drawing/2014/main" id="{D5E64CF2-DFC5-99EF-B6F5-44648E9FF1C8}"/>
+              </a:ext>
+            </a:extLst>
+          </p:cNvPr>
+          <p:cNvPicPr>
+            <a:picLocks noChangeAspect="1"/>
+          </p:cNvPicPr>
+          <p:nvPr/>
+        </p:nvPicPr>
+        <p:blipFill>
+          <a:blip r:embed="rId5"/>
+          <a:stretch>
+            <a:fillRect/>
+          </a:stretch>
+        </p:blipFill>
+        <p:spPr>
+          <a:xfrm>
+            <a:off x="6742306" y="4826131"/>
+            <a:ext cx="5026069" cy="853976"/>
           </a:xfrm>
           <a:prstGeom prst="rect">
             <a:avLst/>
@@ -23982,38 +24150,8 @@
         </p:blipFill>
         <p:spPr>
           <a:xfrm>
-            <a:off x="6557076" y="4709263"/>
+            <a:off x="6857223" y="3429000"/>
             <a:ext cx="3724275" cy="342900"/>
-          </a:xfrm>
-          <a:prstGeom prst="rect">
-            <a:avLst/>
-          </a:prstGeom>
-        </p:spPr>
-      </p:pic>
-      <p:pic>
-        <p:nvPicPr>
-          <p:cNvPr id="8" name="Picture 7">
-            <a:extLst>
-              <a:ext uri="{FF2B5EF4-FFF2-40B4-BE49-F238E27FC236}">
-                <a16:creationId xmlns:a16="http://schemas.microsoft.com/office/drawing/2014/main" id="{42ABE9C1-0A6E-8706-0731-887AEAC26ABC}"/>
-              </a:ext>
-            </a:extLst>
-          </p:cNvPr>
-          <p:cNvPicPr>
-            <a:picLocks noChangeAspect="1"/>
-          </p:cNvPicPr>
-          <p:nvPr/>
-        </p:nvPicPr>
-        <p:blipFill>
-          <a:blip r:embed="rId4"/>
-          <a:stretch>
-            <a:fillRect/>
-          </a:stretch>
-        </p:blipFill>
-        <p:spPr>
-          <a:xfrm>
-            <a:off x="7330717" y="232256"/>
-            <a:ext cx="2339625" cy="3967748"/>
           </a:xfrm>
           <a:prstGeom prst="rect">
             <a:avLst/>
@@ -24296,6 +24434,36 @@
           </a:prstGeom>
         </p:spPr>
       </p:pic>
+      <p:pic>
+        <p:nvPicPr>
+          <p:cNvPr id="3" name="Picture 2">
+            <a:extLst>
+              <a:ext uri="{FF2B5EF4-FFF2-40B4-BE49-F238E27FC236}">
+                <a16:creationId xmlns:a16="http://schemas.microsoft.com/office/drawing/2014/main" id="{2E439600-4DE2-76F3-98B6-AE833947D6FA}"/>
+              </a:ext>
+            </a:extLst>
+          </p:cNvPr>
+          <p:cNvPicPr>
+            <a:picLocks noChangeAspect="1"/>
+          </p:cNvPicPr>
+          <p:nvPr/>
+        </p:nvPicPr>
+        <p:blipFill>
+          <a:blip r:embed="rId5"/>
+          <a:stretch>
+            <a:fillRect/>
+          </a:stretch>
+        </p:blipFill>
+        <p:spPr>
+          <a:xfrm>
+            <a:off x="8353243" y="3050466"/>
+            <a:ext cx="2565057" cy="2021442"/>
+          </a:xfrm>
+          <a:prstGeom prst="rect">
+            <a:avLst/>
+          </a:prstGeom>
+        </p:spPr>
+      </p:pic>
     </p:spTree>
     <p:extLst>
       <p:ext uri="{BB962C8B-B14F-4D97-AF65-F5344CB8AC3E}">
@@ -25038,7 +25206,7 @@
         <p:spPr>
           <a:xfrm>
             <a:off x="6690507" y="2044005"/>
-            <a:ext cx="4646427" cy="523220"/>
+            <a:ext cx="4646427" cy="954107"/>
           </a:xfrm>
           <a:prstGeom prst="rect">
             <a:avLst/>
@@ -25077,15 +25245,7 @@
             </a:r>
             <a:r>
               <a:rPr lang="hr-HR" sz="1400" dirty="0"/>
-              <a:t> i </a:t>
-            </a:r>
-            <a:r>
-              <a:rPr lang="hr-HR" sz="1400" dirty="0" err="1"/>
-              <a:t>promeni</a:t>
-            </a:r>
-            <a:r>
-              <a:rPr lang="hr-HR" sz="1400" dirty="0"/>
-              <a:t> njegov tekst u </a:t>
+              <a:t> i promeni njegov tekst u </a:t>
             </a:r>
             <a:r>
               <a:rPr lang="hr-HR" sz="1400" b="1" dirty="0"/>
@@ -25097,19 +25257,98 @@
             </a:r>
             <a:r>
               <a:rPr lang="hr-HR" sz="1400" b="1" dirty="0"/>
-              <a:t>(BEZ </a:t>
-            </a:r>
-            <a:r>
-              <a:rPr lang="hr-HR" sz="1400" b="1" dirty="0" err="1"/>
-              <a:t>menjanja</a:t>
-            </a:r>
-            <a:r>
-              <a:rPr lang="hr-HR" sz="1400" b="1" dirty="0"/>
-              <a:t> HTML-a)</a:t>
+              <a:t>(BEZ menjanja HTML-a)</a:t>
             </a:r>
             <a:r>
               <a:rPr lang="hr-HR" sz="1400" dirty="0"/>
               <a:t>!</a:t>
+            </a:r>
+            <a:br>
+              <a:rPr lang="en-US" sz="1400" dirty="0"/>
+            </a:br>
+            <a:r>
+              <a:rPr lang="hr-HR" sz="1400" dirty="0"/>
+              <a:t>✔</a:t>
+            </a:r>
+            <a:r>
+              <a:rPr lang="en-US" sz="1400" dirty="0"/>
+              <a:t> index.html </a:t>
+            </a:r>
+            <a:r>
+              <a:rPr lang="en-US" sz="1400" dirty="0" err="1"/>
+              <a:t>mozete</a:t>
+            </a:r>
+            <a:r>
+              <a:rPr lang="en-US" sz="1400" dirty="0"/>
+              <a:t> </a:t>
+            </a:r>
+            <a:r>
+              <a:rPr lang="en-US" sz="1400" dirty="0" err="1"/>
+              <a:t>skinuti</a:t>
+            </a:r>
+            <a:r>
+              <a:rPr lang="en-US" sz="1400" dirty="0"/>
+              <a:t>, </a:t>
+            </a:r>
+            <a:r>
+              <a:rPr lang="en-US" sz="1400" dirty="0" err="1"/>
+              <a:t>logika</a:t>
+            </a:r>
+            <a:r>
+              <a:rPr lang="en-US" sz="1400" dirty="0"/>
+              <a:t> za </a:t>
+            </a:r>
+            <a:r>
+              <a:rPr lang="en-US" sz="1400" dirty="0" err="1"/>
+              <a:t>mijenjanje</a:t>
+            </a:r>
+            <a:r>
+              <a:rPr lang="en-US" sz="1400" dirty="0"/>
+              <a:t> </a:t>
+            </a:r>
+            <a:r>
+              <a:rPr lang="en-US" sz="1400" b="1" dirty="0"/>
+              <a:t>&lt;li&gt; </a:t>
+            </a:r>
+            <a:r>
+              <a:rPr lang="en-US" sz="1400" dirty="0" err="1"/>
+              <a:t>elementa</a:t>
+            </a:r>
+            <a:r>
+              <a:rPr lang="en-US" sz="1400" dirty="0"/>
+              <a:t> </a:t>
+            </a:r>
+            <a:r>
+              <a:rPr lang="en-US" sz="1400" dirty="0" err="1"/>
+              <a:t>neka</a:t>
+            </a:r>
+            <a:r>
+              <a:rPr lang="en-US" sz="1400" dirty="0"/>
+              <a:t> </a:t>
+            </a:r>
+            <a:r>
+              <a:rPr lang="en-US" sz="1400" dirty="0" err="1"/>
+              <a:t>bude</a:t>
+            </a:r>
+            <a:r>
+              <a:rPr lang="en-US" sz="1400" dirty="0"/>
+              <a:t> u </a:t>
+            </a:r>
+            <a:r>
+              <a:rPr lang="en-US" sz="1400" b="1" dirty="0" err="1"/>
+              <a:t>internom</a:t>
+            </a:r>
+            <a:r>
+              <a:rPr lang="en-US" sz="1400" b="1" dirty="0"/>
+              <a:t> </a:t>
+            </a:r>
+            <a:r>
+              <a:rPr lang="en-US" sz="1400" dirty="0" err="1"/>
+              <a:t>js</a:t>
+            </a:r>
+            <a:r>
+              <a:rPr lang="en-US" sz="1400" dirty="0"/>
+              <a:t>-u.</a:t>
             </a:r>
             <a:endParaRPr lang="en-US" sz="1400" b="1" dirty="0"/>
           </a:p>
@@ -25284,7 +25523,7 @@
         <p:spPr>
           <a:xfrm>
             <a:off x="6690507" y="2044005"/>
-            <a:ext cx="4646427" cy="307777"/>
+            <a:ext cx="4646427" cy="954107"/>
           </a:xfrm>
           <a:prstGeom prst="rect">
             <a:avLst/>
@@ -25302,13 +25541,70 @@
               <a:t>✔ </a:t>
             </a:r>
             <a:r>
-              <a:rPr lang="hr-HR" sz="1400" dirty="0" err="1"/>
-              <a:t>Promeni</a:t>
-            </a:r>
+              <a:rPr lang="en-US" sz="1400" dirty="0" err="1"/>
+              <a:t>ispod</a:t>
+            </a:r>
+            <a:r>
+              <a:rPr lang="en-US" sz="1400" dirty="0"/>
+              <a:t> </a:t>
+            </a:r>
+            <a:r>
+              <a:rPr lang="en-US" sz="1400" dirty="0" err="1"/>
+              <a:t>naslova</a:t>
+            </a:r>
+            <a:r>
+              <a:rPr lang="en-US" sz="1400" dirty="0"/>
+              <a:t> </a:t>
+            </a:r>
+            <a:r>
+              <a:rPr lang="en-US" sz="1400" dirty="0" err="1"/>
+              <a:t>dodajte</a:t>
+            </a:r>
+            <a:r>
+              <a:rPr lang="en-US" sz="1400" dirty="0"/>
+              <a:t> link </a:t>
+            </a:r>
+            <a:r>
+              <a:rPr lang="en-US" sz="1400" dirty="0" err="1"/>
+              <a:t>na</a:t>
+            </a:r>
+            <a:r>
+              <a:rPr lang="en-US" sz="1400" dirty="0"/>
+              <a:t> </a:t>
+            </a:r>
+            <a:r>
+              <a:rPr lang="en-US" sz="1400" dirty="0" err="1"/>
+              <a:t>stranicu</a:t>
+            </a:r>
+            <a:r>
+              <a:rPr lang="en-US" sz="1400" dirty="0"/>
+              <a:t> google.com</a:t>
+            </a:r>
+          </a:p>
+          <a:p>
             <a:r>
               <a:rPr lang="hr-HR" sz="1400" dirty="0"/>
-              <a:t> boju Google linka pomoću JavaScript-a</a:t>
-            </a:r>
+              <a:t>✔ Prom</a:t>
+            </a:r>
+            <a:r>
+              <a:rPr lang="en-US" sz="1400" dirty="0"/>
+              <a:t>j</a:t>
+            </a:r>
+            <a:r>
+              <a:rPr lang="hr-HR" sz="1400" dirty="0"/>
+              <a:t>eni boju Google linka pomoću JavaScript-a</a:t>
+            </a:r>
+            <a:r>
+              <a:rPr lang="en-US" sz="1400" dirty="0"/>
+              <a:t> u </a:t>
+            </a:r>
+            <a:r>
+              <a:rPr lang="en-US" sz="1400" dirty="0" err="1"/>
+              <a:t>crvenu</a:t>
+            </a:r>
+            <a:endParaRPr lang="en-US" sz="1400" b="1" dirty="0"/>
+          </a:p>
+          <a:p>
             <a:endParaRPr lang="en-US" sz="1400" b="1" dirty="0"/>
           </a:p>
         </p:txBody>
@@ -25417,8 +25713,8 @@
         </p:nvSpPr>
         <p:spPr>
           <a:xfrm>
-            <a:off x="2194127" y="5111281"/>
-            <a:ext cx="8156170" cy="584775"/>
+            <a:off x="1465832" y="5111281"/>
+            <a:ext cx="8884465" cy="584775"/>
           </a:xfrm>
           <a:prstGeom prst="rect">
             <a:avLst/>
@@ -25436,26 +25732,81 @@
               <a:t>💡</a:t>
             </a:r>
             <a:r>
-              <a:rPr lang="hr-HR" sz="1600" b="1" dirty="0" err="1"/>
-              <a:t>querySelector</a:t>
-            </a:r>
-            <a:r>
               <a:rPr lang="hr-HR" sz="1600" b="1" dirty="0"/>
-              <a:t>() i </a:t>
-            </a:r>
-            <a:r>
-              <a:rPr lang="hr-HR" sz="1600" b="1" dirty="0" err="1"/>
-              <a:t>querySelectorAll</a:t>
-            </a:r>
-            <a:r>
-              <a:rPr lang="hr-HR" sz="1600" b="1" dirty="0"/>
-              <a:t>() </a:t>
+              <a:t>querySelector() i querySelectorAll() </a:t>
             </a:r>
             <a:r>
               <a:rPr lang="hr-HR" sz="1600" dirty="0"/>
               <a:t>su najmoćniji jer mogu selektirati ID, klase i tagove istovremeno.</a:t>
             </a:r>
-            <a:endParaRPr lang="en-US" sz="1600" dirty="0"/>
+            <a:r>
+              <a:rPr lang="en-US" sz="1600" dirty="0"/>
+              <a:t> Ovo cete </a:t>
+            </a:r>
+            <a:r>
+              <a:rPr lang="en-US" sz="1600" dirty="0" err="1"/>
+              <a:t>cesce</a:t>
+            </a:r>
+            <a:r>
+              <a:rPr lang="en-US" sz="1600" dirty="0"/>
+              <a:t> </a:t>
+            </a:r>
+            <a:r>
+              <a:rPr lang="en-US" sz="1600" dirty="0" err="1"/>
+              <a:t>vidjati</a:t>
+            </a:r>
+            <a:r>
+              <a:rPr lang="en-US" sz="1600" dirty="0"/>
+              <a:t> u </a:t>
+            </a:r>
+            <a:r>
+              <a:rPr lang="en-US" sz="1600" dirty="0" err="1"/>
+              <a:t>kodu</a:t>
+            </a:r>
+            <a:r>
+              <a:rPr lang="en-US" sz="1600" dirty="0"/>
+              <a:t>. Puno </a:t>
+            </a:r>
+            <a:r>
+              <a:rPr lang="en-US" sz="1600" dirty="0" err="1"/>
+              <a:t>su</a:t>
+            </a:r>
+            <a:r>
+              <a:rPr lang="en-US" sz="1600" dirty="0"/>
+              <a:t> </a:t>
+            </a:r>
+            <a:r>
+              <a:rPr lang="en-US" sz="1600" dirty="0" err="1"/>
+              <a:t>mocniji</a:t>
+            </a:r>
+            <a:r>
+              <a:rPr lang="en-US" sz="1600" dirty="0"/>
+              <a:t> I </a:t>
+            </a:r>
+            <a:r>
+              <a:rPr lang="en-US" sz="1600" dirty="0" err="1"/>
+              <a:t>opsirnije</a:t>
+            </a:r>
+            <a:r>
+              <a:rPr lang="en-US" sz="1600" dirty="0"/>
+              <a:t> </a:t>
+            </a:r>
+            <a:r>
+              <a:rPr lang="en-US" sz="1600" dirty="0" err="1"/>
+              <a:t>nego</a:t>
+            </a:r>
+            <a:r>
+              <a:rPr lang="en-US" sz="1600" dirty="0"/>
+              <a:t> </a:t>
+            </a:r>
+            <a:r>
+              <a:rPr lang="en-US" sz="1600" dirty="0" err="1"/>
+              <a:t>getElements</a:t>
+            </a:r>
+            <a:r>
+              <a:rPr lang="en-US" sz="1600" dirty="0"/>
+              <a:t>()</a:t>
+            </a:r>
           </a:p>
         </p:txBody>
       </p:sp>
@@ -25477,7 +25828,13 @@
   <p:cSld>
     <p:spTree>
       <p:nvGrpSpPr>
-        <p:cNvPr id="1" name=""/>
+        <p:cNvPr id="1" name="">
+          <a:extLst>
+            <a:ext uri="{FF2B5EF4-FFF2-40B4-BE49-F238E27FC236}">
+              <a16:creationId xmlns:a16="http://schemas.microsoft.com/office/drawing/2014/main" id="{7D4E8A6A-23FC-2689-A644-619B6BC19CA6}"/>
+            </a:ext>
+          </a:extLst>
+        </p:cNvPr>
         <p:cNvGrpSpPr/>
         <p:nvPr/>
       </p:nvGrpSpPr>
@@ -25491,10 +25848,10 @@
       </p:grpSpPr>
       <p:sp>
         <p:nvSpPr>
-          <p:cNvPr id="9" name="Title 1">
-            <a:extLst>
-              <a:ext uri="{FF2B5EF4-FFF2-40B4-BE49-F238E27FC236}">
-                <a16:creationId xmlns:a16="http://schemas.microsoft.com/office/drawing/2014/main" id="{790829E5-EBA7-C886-B214-68BC0C03E7DD}"/>
+          <p:cNvPr id="2" name="Title 1">
+            <a:extLst>
+              <a:ext uri="{FF2B5EF4-FFF2-40B4-BE49-F238E27FC236}">
+                <a16:creationId xmlns:a16="http://schemas.microsoft.com/office/drawing/2014/main" id="{109CA89D-2C53-6510-7179-FDBE6FC9CCB0}"/>
               </a:ext>
             </a:extLst>
           </p:cNvPr>
@@ -25502,31 +25859,17 @@
             <a:spLocks noGrp="1"/>
           </p:cNvSpPr>
           <p:nvPr>
-            <p:ph type="ctrTitle"/>
+            <p:ph type="title"/>
           </p:nvPr>
         </p:nvSpPr>
-        <p:spPr>
-          <a:xfrm>
-            <a:off x="1018954" y="929972"/>
-            <a:ext cx="9144000" cy="1013780"/>
-          </a:xfrm>
-        </p:spPr>
+        <p:spPr/>
         <p:txBody>
           <a:bodyPr/>
           <a:lstStyle/>
           <a:p>
-            <a:pPr algn="ctr"/>
             <a:r>
               <a:rPr lang="en-US" dirty="0"/>
-              <a:t>ZAVR</a:t>
-            </a:r>
-            <a:r>
-              <a:rPr lang="hr-HR" dirty="0"/>
-              <a:t>š</a:t>
-            </a:r>
-            <a:r>
-              <a:rPr lang="en-US" dirty="0"/>
-              <a:t>NA VJE</a:t>
+              <a:t>VJE</a:t>
             </a:r>
             <a:r>
               <a:rPr lang="hr-HR" dirty="0"/>
@@ -25542,10 +25885,10 @@
       </p:sp>
       <p:sp>
         <p:nvSpPr>
-          <p:cNvPr id="10" name="Text Placeholder 5">
-            <a:extLst>
-              <a:ext uri="{FF2B5EF4-FFF2-40B4-BE49-F238E27FC236}">
-                <a16:creationId xmlns:a16="http://schemas.microsoft.com/office/drawing/2014/main" id="{5B54BBB0-24C3-34EA-BD12-D41BA8DAB951}"/>
+          <p:cNvPr id="6" name="Text Placeholder 5">
+            <a:extLst>
+              <a:ext uri="{FF2B5EF4-FFF2-40B4-BE49-F238E27FC236}">
+                <a16:creationId xmlns:a16="http://schemas.microsoft.com/office/drawing/2014/main" id="{ED910D2B-7A28-6B03-45F9-E0AE69B933AC}"/>
               </a:ext>
             </a:extLst>
           </p:cNvPr>
@@ -25553,147 +25896,801 @@
             <a:spLocks noGrp="1"/>
           </p:cNvSpPr>
           <p:nvPr>
-            <p:ph type="subTitle" idx="1"/>
+            <p:ph type="body" sz="half" idx="2"/>
           </p:nvPr>
         </p:nvSpPr>
-        <p:spPr>
-          <a:xfrm>
-            <a:off x="1061483" y="2213231"/>
-            <a:ext cx="9144000" cy="1492216"/>
-          </a:xfrm>
-        </p:spPr>
+        <p:spPr/>
         <p:txBody>
           <a:bodyPr>
-            <a:noAutofit/>
+            <a:normAutofit fontScale="85000" lnSpcReduction="20000"/>
           </a:bodyPr>
           <a:lstStyle/>
           <a:p>
-            <a:r>
-              <a:rPr lang="hr-HR" sz="1200" b="1" dirty="0"/>
-              <a:t>Zadatak: </a:t>
-            </a:r>
-            <a:r>
-              <a:rPr lang="en-US" sz="1200" b="1" dirty="0" err="1"/>
-              <a:t>dodajte</a:t>
-            </a:r>
-            <a:r>
-              <a:rPr lang="en-US" sz="1200" b="1" dirty="0"/>
+            <a:pPr marL="285750" indent="-285750">
+              <a:buFontTx/>
+              <a:buChar char="-"/>
+            </a:pPr>
+            <a:r>
+              <a:rPr lang="en-US" dirty="0"/>
+              <a:t>- </a:t>
+            </a:r>
+            <a:r>
+              <a:rPr lang="en-US" dirty="0" err="1"/>
+              <a:t>Preuzmite</a:t>
+            </a:r>
+            <a:r>
+              <a:rPr lang="en-US" dirty="0"/>
+              <a:t> .zip </a:t>
+            </a:r>
+            <a:r>
+              <a:rPr lang="en-US" dirty="0" err="1"/>
+              <a:t>fajl</a:t>
+            </a:r>
+            <a:r>
+              <a:rPr lang="en-US" dirty="0"/>
               <a:t> </a:t>
             </a:r>
             <a:r>
-              <a:rPr lang="en-US" sz="1200" b="1" dirty="0" err="1"/>
-              <a:t>interaktivnost</a:t>
-            </a:r>
-            <a:r>
-              <a:rPr lang="en-US" sz="1200" b="1" dirty="0"/>
+              <a:rPr lang="en-US" dirty="0" err="1"/>
+              <a:t>sa</a:t>
+            </a:r>
+            <a:r>
+              <a:rPr lang="en-US" dirty="0"/>
               <a:t> </a:t>
             </a:r>
             <a:r>
-              <a:rPr lang="en-US" sz="1200" b="1" dirty="0" err="1"/>
-              <a:t>svom</a:t>
-            </a:r>
-            <a:r>
-              <a:rPr lang="en-US" sz="1200" b="1" dirty="0"/>
-              <a:t> video </a:t>
-            </a:r>
-            <a:r>
-              <a:rPr lang="en-US" sz="1200" b="1" dirty="0" err="1"/>
-              <a:t>klub</a:t>
-            </a:r>
-            <a:r>
-              <a:rPr lang="en-US" sz="1200" b="1" dirty="0"/>
+              <a:rPr lang="en-US" dirty="0" err="1"/>
+              <a:t>osnovnim</a:t>
+            </a:r>
+            <a:r>
+              <a:rPr lang="en-US" dirty="0"/>
               <a:t> </a:t>
             </a:r>
             <a:r>
-              <a:rPr lang="en-US" sz="1200" b="1" dirty="0" err="1"/>
-              <a:t>sajtu</a:t>
-            </a:r>
-            <a:endParaRPr lang="hr-HR" sz="1200" b="1" dirty="0"/>
-          </a:p>
-          <a:p>
-            <a:r>
-              <a:rPr lang="hr-HR" sz="1200" b="1" dirty="0"/>
-              <a:t>Cilj:</a:t>
-            </a:r>
-            <a:endParaRPr lang="hr-HR" sz="1200" dirty="0"/>
-          </a:p>
-          <a:p>
-            <a:pPr>
-              <a:buFont typeface="Arial" panose="020B0604020202020204" pitchFamily="34" charset="0"/>
-              <a:buChar char="•"/>
+              <a:rPr lang="en-US" dirty="0" err="1"/>
+              <a:t>skeletonom</a:t>
+            </a:r>
+            <a:r>
+              <a:rPr lang="en-US" dirty="0"/>
+              <a:t> </a:t>
+            </a:r>
+            <a:r>
+              <a:rPr lang="en-US" dirty="0" err="1"/>
+              <a:t>websajta</a:t>
+            </a:r>
+            <a:r>
+              <a:rPr lang="en-US" dirty="0"/>
+              <a:t> za casino </a:t>
+            </a:r>
+            <a:r>
+              <a:rPr lang="en-US" dirty="0" err="1"/>
+              <a:t>igru</a:t>
+            </a:r>
+            <a:endParaRPr lang="en-US" dirty="0"/>
+          </a:p>
+          <a:p>
+            <a:pPr marL="285750" indent="-285750">
+              <a:buFontTx/>
+              <a:buChar char="-"/>
             </a:pPr>
             <a:r>
-              <a:rPr lang="en-US" sz="1200" dirty="0"/>
+              <a:rPr lang="en-US" dirty="0"/>
+              <a:t>- Na </a:t>
+            </a:r>
+            <a:r>
+              <a:rPr lang="en-US" dirty="0" err="1"/>
+              <a:t>vrhu</a:t>
+            </a:r>
+            <a:r>
+              <a:rPr lang="en-US" dirty="0"/>
+              <a:t> </a:t>
+            </a:r>
+            <a:r>
+              <a:rPr lang="en-US" dirty="0" err="1"/>
+              <a:t>stranice</a:t>
+            </a:r>
+            <a:r>
+              <a:rPr lang="en-US" dirty="0"/>
+              <a:t> h1 </a:t>
+            </a:r>
+            <a:r>
+              <a:rPr lang="en-US" dirty="0" err="1"/>
+              <a:t>naslov</a:t>
+            </a:r>
+            <a:r>
+              <a:rPr lang="en-US" dirty="0"/>
+              <a:t>: “Refresh Me”. </a:t>
+            </a:r>
+            <a:r>
+              <a:rPr lang="en-US" b="1" dirty="0"/>
+              <a:t>Font-family - Lobster</a:t>
+            </a:r>
+          </a:p>
+          <a:p>
+            <a:pPr marL="285750" indent="-285750">
+              <a:buFontTx/>
+              <a:buChar char="-"/>
+            </a:pPr>
+            <a:r>
+              <a:rPr lang="en-US" dirty="0"/>
               <a:t>- </a:t>
             </a:r>
             <a:r>
-              <a:rPr lang="en-US" sz="1200" dirty="0" err="1"/>
-              <a:t>dodati</a:t>
-            </a:r>
-            <a:r>
-              <a:rPr lang="en-US" sz="1200" dirty="0"/>
+              <a:rPr lang="en-US" dirty="0" err="1"/>
+              <a:t>Ispod</a:t>
+            </a:r>
+            <a:r>
+              <a:rPr lang="en-US" dirty="0"/>
               <a:t> </a:t>
             </a:r>
             <a:r>
-              <a:rPr lang="en-US" sz="1200" dirty="0" err="1"/>
-              <a:t>funkcinalnost</a:t>
-            </a:r>
-            <a:r>
-              <a:rPr lang="en-US" sz="1200" dirty="0"/>
+              <a:rPr lang="en-US" dirty="0" err="1"/>
+              <a:t>naslova</a:t>
+            </a:r>
+            <a:r>
+              <a:rPr lang="en-US" dirty="0"/>
               <a:t> </a:t>
             </a:r>
             <a:r>
-              <a:rPr lang="en-US" sz="1200" dirty="0" err="1"/>
+              <a:rPr lang="en-US" dirty="0" err="1"/>
+              <a:t>dva</a:t>
+            </a:r>
+            <a:r>
+              <a:rPr lang="en-US" dirty="0"/>
+              <a:t> </a:t>
+            </a:r>
+            <a:r>
+              <a:rPr lang="en-US" dirty="0" err="1"/>
+              <a:t>odjeljka</a:t>
+            </a:r>
+            <a:r>
+              <a:rPr lang="en-US" dirty="0"/>
+              <a:t>: “Player 1” </a:t>
+            </a:r>
+            <a:r>
+              <a:rPr lang="en-US" dirty="0" err="1"/>
+              <a:t>i</a:t>
+            </a:r>
+            <a:r>
+              <a:rPr lang="en-US" dirty="0"/>
+              <a:t> “Player 2”, </a:t>
+            </a:r>
+            <a:r>
+              <a:rPr lang="en-US" dirty="0" err="1"/>
+              <a:t>svaki</a:t>
+            </a:r>
+            <a:r>
+              <a:rPr lang="en-US" dirty="0"/>
+              <a:t> </a:t>
+            </a:r>
+            <a:r>
+              <a:rPr lang="en-US" dirty="0" err="1"/>
+              <a:t>sa</a:t>
+            </a:r>
+            <a:r>
+              <a:rPr lang="en-US" dirty="0"/>
+              <a:t> </a:t>
+            </a:r>
+            <a:r>
+              <a:rPr lang="en-US" dirty="0" err="1"/>
+              <a:t>slikom</a:t>
+            </a:r>
+            <a:r>
+              <a:rPr lang="en-US" dirty="0"/>
+              <a:t> </a:t>
+            </a:r>
+            <a:r>
+              <a:rPr lang="en-US" dirty="0" err="1"/>
+              <a:t>kocke</a:t>
+            </a:r>
+            <a:r>
+              <a:rPr lang="en-US" dirty="0"/>
+              <a:t>. </a:t>
+            </a:r>
+            <a:r>
+              <a:rPr lang="en-US" b="1" dirty="0"/>
+              <a:t>font-family Indie flower</a:t>
+            </a:r>
+          </a:p>
+          <a:p>
+            <a:pPr marL="285750" indent="-285750">
+              <a:buFontTx/>
+              <a:buChar char="-"/>
+            </a:pPr>
+            <a:r>
+              <a:rPr lang="en-US" b="1" dirty="0"/>
+              <a:t>- </a:t>
+            </a:r>
+            <a:r>
+              <a:rPr lang="en-US" dirty="0"/>
+              <a:t>Footer</a:t>
+            </a:r>
+            <a:r>
+              <a:rPr lang="en-US" b="1" dirty="0"/>
+              <a:t> font-family Indie flower</a:t>
+            </a:r>
+          </a:p>
+          <a:p>
+            <a:pPr marL="285750" indent="-285750">
+              <a:buFontTx/>
+              <a:buChar char="-"/>
+            </a:pPr>
+            <a:r>
+              <a:rPr lang="en-US" dirty="0"/>
+              <a:t>- Pri </a:t>
+            </a:r>
+            <a:r>
+              <a:rPr lang="en-US" dirty="0" err="1"/>
+              <a:t>svakom</a:t>
+            </a:r>
+            <a:r>
+              <a:rPr lang="en-US" dirty="0"/>
+              <a:t> </a:t>
+            </a:r>
+            <a:r>
+              <a:rPr lang="en-US" dirty="0" err="1"/>
+              <a:t>osvježavanju</a:t>
+            </a:r>
+            <a:r>
+              <a:rPr lang="en-US" dirty="0"/>
+              <a:t> </a:t>
+            </a:r>
+            <a:r>
+              <a:rPr lang="en-US" dirty="0" err="1"/>
+              <a:t>stranice</a:t>
+            </a:r>
+            <a:r>
+              <a:rPr lang="en-US" dirty="0"/>
+              <a:t> (reload) </a:t>
+            </a:r>
+            <a:r>
+              <a:rPr lang="en-US" dirty="0" err="1"/>
+              <a:t>kocke</a:t>
+            </a:r>
+            <a:r>
+              <a:rPr lang="en-US" dirty="0"/>
+              <a:t> se </a:t>
+            </a:r>
+            <a:r>
+              <a:rPr lang="en-US" dirty="0" err="1"/>
+              <a:t>nasumično</a:t>
+            </a:r>
+            <a:r>
+              <a:rPr lang="en-US" dirty="0"/>
+              <a:t> “</a:t>
+            </a:r>
+            <a:r>
+              <a:rPr lang="en-US" dirty="0" err="1"/>
+              <a:t>bacaju</a:t>
+            </a:r>
+            <a:r>
+              <a:rPr lang="en-US" dirty="0"/>
+              <a:t>” – </a:t>
+            </a:r>
+            <a:r>
+              <a:rPr lang="en-US" dirty="0" err="1"/>
+              <a:t>mijenjaju</a:t>
+            </a:r>
+            <a:r>
+              <a:rPr lang="en-US" dirty="0"/>
+              <a:t> se </a:t>
+            </a:r>
+            <a:r>
+              <a:rPr lang="en-US" dirty="0" err="1"/>
+              <a:t>njihove</a:t>
+            </a:r>
+            <a:r>
+              <a:rPr lang="en-US" dirty="0"/>
+              <a:t> </a:t>
+            </a:r>
+            <a:r>
+              <a:rPr lang="en-US" dirty="0" err="1"/>
+              <a:t>vrijednosti</a:t>
+            </a:r>
+            <a:r>
+              <a:rPr lang="en-US" dirty="0"/>
+              <a:t> (1–6).</a:t>
+            </a:r>
+          </a:p>
+          <a:p>
+            <a:pPr marL="285750" indent="-285750">
+              <a:buFontTx/>
+              <a:buChar char="-"/>
+            </a:pPr>
+            <a:r>
+              <a:rPr lang="en-US" dirty="0"/>
+              <a:t>- Na </a:t>
+            </a:r>
+            <a:r>
+              <a:rPr lang="en-US" dirty="0" err="1"/>
+              <a:t>temelju</a:t>
+            </a:r>
+            <a:r>
+              <a:rPr lang="en-US" dirty="0"/>
+              <a:t> </a:t>
+            </a:r>
+            <a:r>
+              <a:rPr lang="en-US" dirty="0" err="1"/>
+              <a:t>većeg</a:t>
+            </a:r>
+            <a:r>
+              <a:rPr lang="en-US" dirty="0"/>
+              <a:t> </a:t>
+            </a:r>
+            <a:r>
+              <a:rPr lang="en-US" dirty="0" err="1"/>
+              <a:t>broja</a:t>
+            </a:r>
+            <a:r>
+              <a:rPr lang="en-US" dirty="0"/>
+              <a:t> </a:t>
+            </a:r>
+            <a:r>
+              <a:rPr lang="en-US" dirty="0" err="1"/>
               <a:t>na</a:t>
             </a:r>
             <a:r>
-              <a:rPr lang="en-US" sz="1200" dirty="0"/>
+              <a:rPr lang="en-US" dirty="0"/>
               <a:t> </a:t>
             </a:r>
             <a:r>
-              <a:rPr lang="en-US" sz="1200" dirty="0" err="1"/>
-              <a:t>klik</a:t>
-            </a:r>
-            <a:r>
-              <a:rPr lang="en-US" sz="1200" dirty="0"/>
+              <a:rPr lang="en-US" dirty="0" err="1"/>
+              <a:t>kocki</a:t>
+            </a:r>
+            <a:r>
+              <a:rPr lang="en-US" dirty="0"/>
               <a:t> </a:t>
             </a:r>
             <a:r>
-              <a:rPr lang="en-US" sz="1200" dirty="0" err="1"/>
-              <a:t>kategorije</a:t>
-            </a:r>
-            <a:r>
-              <a:rPr lang="en-US" sz="1200" dirty="0"/>
-              <a:t> da </a:t>
-            </a:r>
-            <a:r>
-              <a:rPr lang="en-US" sz="1200" dirty="0" err="1"/>
-              <a:t>izadje</a:t>
-            </a:r>
-            <a:r>
-              <a:rPr lang="en-US" sz="1200" dirty="0"/>
+              <a:rPr lang="en-US" dirty="0" err="1"/>
+              <a:t>stranica</a:t>
+            </a:r>
+            <a:r>
+              <a:rPr lang="en-US" dirty="0"/>
               <a:t> </a:t>
             </a:r>
             <a:r>
-              <a:rPr lang="en-US" sz="1200" dirty="0" err="1"/>
-              <a:t>padajuci</a:t>
-            </a:r>
-            <a:r>
-              <a:rPr lang="en-US" sz="1200" dirty="0"/>
+              <a:rPr lang="en-US" dirty="0" err="1"/>
+              <a:t>ispisuje</a:t>
+            </a:r>
+            <a:r>
+              <a:rPr lang="en-US" dirty="0"/>
               <a:t> </a:t>
             </a:r>
             <a:r>
-              <a:rPr lang="en-US" sz="1200" dirty="0" err="1"/>
-              <a:t>meni</a:t>
-            </a:r>
-            <a:endParaRPr lang="en-US" sz="1200" dirty="0"/>
-          </a:p>
-        </p:txBody>
-      </p:sp>
+              <a:rPr lang="en-US" dirty="0" err="1"/>
+              <a:t>pobjednika</a:t>
+            </a:r>
+            <a:r>
+              <a:rPr lang="en-US" dirty="0"/>
+              <a:t> (“Player 1 Wins!”, “Player 2 Wins!” </a:t>
+            </a:r>
+            <a:r>
+              <a:rPr lang="en-US" dirty="0" err="1"/>
+              <a:t>ili</a:t>
+            </a:r>
+            <a:r>
+              <a:rPr lang="en-US" dirty="0"/>
+              <a:t> </a:t>
+            </a:r>
+            <a:r>
+              <a:rPr lang="en-US" dirty="0" err="1"/>
+              <a:t>neriješeno</a:t>
+            </a:r>
+            <a:r>
+              <a:rPr lang="en-US" dirty="0"/>
+              <a:t>).</a:t>
+            </a:r>
+          </a:p>
+          <a:p>
+            <a:pPr marL="285750" indent="-285750">
+              <a:buFontTx/>
+              <a:buChar char="-"/>
+            </a:pPr>
+            <a:endParaRPr lang="hr-HR" dirty="0"/>
+          </a:p>
+        </p:txBody>
+      </p:sp>
+      <p:pic>
+        <p:nvPicPr>
+          <p:cNvPr id="8" name="Picture 7">
+            <a:extLst>
+              <a:ext uri="{FF2B5EF4-FFF2-40B4-BE49-F238E27FC236}">
+                <a16:creationId xmlns:a16="http://schemas.microsoft.com/office/drawing/2014/main" id="{9D4F1ADC-CA49-30F5-6FE7-FBE51DE46BAE}"/>
+              </a:ext>
+            </a:extLst>
+          </p:cNvPr>
+          <p:cNvPicPr>
+            <a:picLocks noChangeAspect="1"/>
+          </p:cNvPicPr>
+          <p:nvPr/>
+        </p:nvPicPr>
+        <p:blipFill>
+          <a:blip r:embed="rId3"/>
+          <a:stretch>
+            <a:fillRect/>
+          </a:stretch>
+        </p:blipFill>
+        <p:spPr>
+          <a:xfrm>
+            <a:off x="6229962" y="437378"/>
+            <a:ext cx="5196322" cy="5706944"/>
+          </a:xfrm>
+          <a:prstGeom prst="rect">
+            <a:avLst/>
+          </a:prstGeom>
+        </p:spPr>
+      </p:pic>
     </p:spTree>
     <p:extLst>
       <p:ext uri="{BB962C8B-B14F-4D97-AF65-F5344CB8AC3E}">
-        <p14:creationId xmlns:p14="http://schemas.microsoft.com/office/powerpoint/2010/main" val="3533409194"/>
+        <p14:creationId xmlns:p14="http://schemas.microsoft.com/office/powerpoint/2010/main" val="1105035701"/>
+      </p:ext>
+    </p:extLst>
+  </p:cSld>
+  <p:clrMapOvr>
+    <a:masterClrMapping/>
+  </p:clrMapOvr>
+</p:sld>
+</file>
+
+<file path=ppt/slides/slide36.xml><?xml version="1.0" encoding="utf-8"?>
+<p:sld xmlns:a="http://schemas.openxmlformats.org/drawingml/2006/main" xmlns:r="http://schemas.openxmlformats.org/officeDocument/2006/relationships" xmlns:p="http://schemas.openxmlformats.org/presentationml/2006/main">
+  <p:cSld>
+    <p:spTree>
+      <p:nvGrpSpPr>
+        <p:cNvPr id="1" name="">
+          <a:extLst>
+            <a:ext uri="{FF2B5EF4-FFF2-40B4-BE49-F238E27FC236}">
+              <a16:creationId xmlns:a16="http://schemas.microsoft.com/office/drawing/2014/main" id="{FF9060FB-6CBF-BB25-E074-FDF012E16035}"/>
+            </a:ext>
+          </a:extLst>
+        </p:cNvPr>
+        <p:cNvGrpSpPr/>
+        <p:nvPr/>
+      </p:nvGrpSpPr>
+      <p:grpSpPr>
+        <a:xfrm>
+          <a:off x="0" y="0"/>
+          <a:ext cx="0" cy="0"/>
+          <a:chOff x="0" y="0"/>
+          <a:chExt cx="0" cy="0"/>
+        </a:xfrm>
+      </p:grpSpPr>
+      <p:sp>
+        <p:nvSpPr>
+          <p:cNvPr id="4" name="Title 1">
+            <a:extLst>
+              <a:ext uri="{FF2B5EF4-FFF2-40B4-BE49-F238E27FC236}">
+                <a16:creationId xmlns:a16="http://schemas.microsoft.com/office/drawing/2014/main" id="{DF6B127C-EE1F-BE98-CDE2-4826BDCEB58D}"/>
+              </a:ext>
+            </a:extLst>
+          </p:cNvPr>
+          <p:cNvSpPr txBox="1">
+            <a:spLocks/>
+          </p:cNvSpPr>
+          <p:nvPr/>
+        </p:nvSpPr>
+        <p:spPr>
+          <a:xfrm>
+            <a:off x="990600" y="383056"/>
+            <a:ext cx="10515600" cy="853976"/>
+          </a:xfrm>
+          <a:prstGeom prst="rect">
+            <a:avLst/>
+          </a:prstGeom>
+        </p:spPr>
+        <p:txBody>
+          <a:bodyPr vert="horz" lIns="91440" tIns="45720" rIns="91440" bIns="45720" rtlCol="0" anchor="ctr">
+            <a:normAutofit/>
+          </a:bodyPr>
+          <a:lstStyle>
+            <a:lvl1pPr algn="l" defTabSz="914400" rtl="0" eaLnBrk="1" latinLnBrk="0" hangingPunct="1">
+              <a:lnSpc>
+                <a:spcPct val="90000"/>
+              </a:lnSpc>
+              <a:spcBef>
+                <a:spcPct val="0"/>
+              </a:spcBef>
+              <a:buNone/>
+              <a:defRPr sz="3600" b="1" i="0" kern="1200" cap="all" baseline="0">
+                <a:solidFill>
+                  <a:schemeClr val="tx2"/>
+                </a:solidFill>
+                <a:latin typeface="+mj-lt"/>
+                <a:ea typeface="Open Sans Semibold" panose="020B0606030504020204" pitchFamily="34" charset="0"/>
+                <a:cs typeface="Open Sans Semibold" panose="020B0606030504020204" pitchFamily="34" charset="0"/>
+              </a:defRPr>
+            </a:lvl1pPr>
+          </a:lstStyle>
+          <a:p>
+            <a:r>
+              <a:rPr lang="hr-HR" dirty="0"/>
+              <a:t>JavaScript</a:t>
+            </a:r>
+            <a:r>
+              <a:rPr lang="en-US" dirty="0"/>
+              <a:t> – EVENT LISTENERS</a:t>
+            </a:r>
+            <a:endParaRPr lang="hr-HR" dirty="0"/>
+          </a:p>
+        </p:txBody>
+      </p:sp>
+      <p:sp>
+        <p:nvSpPr>
+          <p:cNvPr id="14" name="Title 1">
+            <a:extLst>
+              <a:ext uri="{FF2B5EF4-FFF2-40B4-BE49-F238E27FC236}">
+                <a16:creationId xmlns:a16="http://schemas.microsoft.com/office/drawing/2014/main" id="{43329BE1-90FE-F965-D983-BEB25D65A35C}"/>
+              </a:ext>
+            </a:extLst>
+          </p:cNvPr>
+          <p:cNvSpPr txBox="1">
+            <a:spLocks/>
+          </p:cNvSpPr>
+          <p:nvPr/>
+        </p:nvSpPr>
+        <p:spPr>
+          <a:xfrm>
+            <a:off x="6651210" y="1401091"/>
+            <a:ext cx="5328139" cy="853976"/>
+          </a:xfrm>
+          <a:prstGeom prst="rect">
+            <a:avLst/>
+          </a:prstGeom>
+        </p:spPr>
+        <p:txBody>
+          <a:bodyPr vert="horz" lIns="91440" tIns="45720" rIns="91440" bIns="45720" rtlCol="0" anchor="ctr">
+            <a:normAutofit/>
+          </a:bodyPr>
+          <a:lstStyle>
+            <a:lvl1pPr algn="l" defTabSz="914400" rtl="0" eaLnBrk="1" latinLnBrk="0" hangingPunct="1">
+              <a:lnSpc>
+                <a:spcPct val="90000"/>
+              </a:lnSpc>
+              <a:spcBef>
+                <a:spcPct val="0"/>
+              </a:spcBef>
+              <a:buNone/>
+              <a:defRPr sz="3600" b="1" i="0" kern="1200" cap="all" baseline="0">
+                <a:solidFill>
+                  <a:schemeClr val="tx2"/>
+                </a:solidFill>
+                <a:latin typeface="+mj-lt"/>
+                <a:ea typeface="Open Sans Semibold" panose="020B0606030504020204" pitchFamily="34" charset="0"/>
+                <a:cs typeface="Open Sans Semibold" panose="020B0606030504020204" pitchFamily="34" charset="0"/>
+              </a:defRPr>
+            </a:lvl1pPr>
+          </a:lstStyle>
+          <a:p>
+            <a:r>
+              <a:rPr lang="en-US" sz="1600" dirty="0"/>
+              <a:t>VJEZBA</a:t>
+            </a:r>
+            <a:endParaRPr lang="hr-HR" sz="1600" dirty="0">
+              <a:solidFill>
+                <a:schemeClr val="accent3"/>
+              </a:solidFill>
+            </a:endParaRPr>
+          </a:p>
+        </p:txBody>
+      </p:sp>
+      <p:sp>
+        <p:nvSpPr>
+          <p:cNvPr id="16" name="TextBox 15">
+            <a:extLst>
+              <a:ext uri="{FF2B5EF4-FFF2-40B4-BE49-F238E27FC236}">
+                <a16:creationId xmlns:a16="http://schemas.microsoft.com/office/drawing/2014/main" id="{9D59F3FA-037C-0A01-6ECC-0FCC96C4721E}"/>
+              </a:ext>
+            </a:extLst>
+          </p:cNvPr>
+          <p:cNvSpPr txBox="1"/>
+          <p:nvPr/>
+        </p:nvSpPr>
+        <p:spPr>
+          <a:xfrm>
+            <a:off x="6690507" y="2044005"/>
+            <a:ext cx="4646427" cy="954107"/>
+          </a:xfrm>
+          <a:prstGeom prst="rect">
+            <a:avLst/>
+          </a:prstGeom>
+          <a:noFill/>
+        </p:spPr>
+        <p:txBody>
+          <a:bodyPr wrap="square">
+            <a:spAutoFit/>
+          </a:bodyPr>
+          <a:lstStyle/>
+          <a:p>
+            <a:r>
+              <a:rPr lang="hr-HR" sz="1400" dirty="0"/>
+              <a:t>✔ </a:t>
+            </a:r>
+            <a:r>
+              <a:rPr lang="en-US" sz="1400" dirty="0" err="1"/>
+              <a:t>ispod</a:t>
+            </a:r>
+            <a:r>
+              <a:rPr lang="en-US" sz="1400" dirty="0"/>
+              <a:t> </a:t>
+            </a:r>
+            <a:r>
+              <a:rPr lang="en-US" sz="1400" dirty="0" err="1"/>
+              <a:t>naslova</a:t>
+            </a:r>
+            <a:r>
+              <a:rPr lang="en-US" sz="1400" dirty="0"/>
+              <a:t> </a:t>
+            </a:r>
+            <a:r>
+              <a:rPr lang="en-US" sz="1400" dirty="0" err="1"/>
+              <a:t>dodajte</a:t>
+            </a:r>
+            <a:r>
+              <a:rPr lang="en-US" sz="1400" dirty="0"/>
+              <a:t> link </a:t>
+            </a:r>
+            <a:r>
+              <a:rPr lang="en-US" sz="1400" dirty="0" err="1"/>
+              <a:t>na</a:t>
+            </a:r>
+            <a:r>
+              <a:rPr lang="en-US" sz="1400" dirty="0"/>
+              <a:t> </a:t>
+            </a:r>
+            <a:r>
+              <a:rPr lang="en-US" sz="1400" dirty="0" err="1"/>
+              <a:t>stranicu</a:t>
+            </a:r>
+            <a:r>
+              <a:rPr lang="en-US" sz="1400" dirty="0"/>
+              <a:t> google.com</a:t>
+            </a:r>
+          </a:p>
+          <a:p>
+            <a:r>
+              <a:rPr lang="hr-HR" sz="1400" dirty="0"/>
+              <a:t>✔ Prom</a:t>
+            </a:r>
+            <a:r>
+              <a:rPr lang="en-US" sz="1400" dirty="0"/>
+              <a:t>j</a:t>
+            </a:r>
+            <a:r>
+              <a:rPr lang="hr-HR" sz="1400" dirty="0"/>
+              <a:t>eni boju Google linka pomoću JavaScript-a</a:t>
+            </a:r>
+            <a:r>
+              <a:rPr lang="en-US" sz="1400" dirty="0"/>
+              <a:t> u </a:t>
+            </a:r>
+            <a:r>
+              <a:rPr lang="en-US" sz="1400" dirty="0" err="1"/>
+              <a:t>crvenu</a:t>
+            </a:r>
+            <a:endParaRPr lang="en-US" sz="1400" b="1" dirty="0"/>
+          </a:p>
+          <a:p>
+            <a:endParaRPr lang="en-US" sz="1400" b="1" dirty="0"/>
+          </a:p>
+        </p:txBody>
+      </p:sp>
+      <p:sp>
+        <p:nvSpPr>
+          <p:cNvPr id="17" name="TextBox 16">
+            <a:extLst>
+              <a:ext uri="{FF2B5EF4-FFF2-40B4-BE49-F238E27FC236}">
+                <a16:creationId xmlns:a16="http://schemas.microsoft.com/office/drawing/2014/main" id="{C76DF794-EC26-7A4A-5DFD-80F87D76AF51}"/>
+              </a:ext>
+            </a:extLst>
+          </p:cNvPr>
+          <p:cNvSpPr txBox="1"/>
+          <p:nvPr/>
+        </p:nvSpPr>
+        <p:spPr>
+          <a:xfrm>
+            <a:off x="1465832" y="5111281"/>
+            <a:ext cx="8884465" cy="584775"/>
+          </a:xfrm>
+          <a:prstGeom prst="rect">
+            <a:avLst/>
+          </a:prstGeom>
+          <a:noFill/>
+        </p:spPr>
+        <p:txBody>
+          <a:bodyPr wrap="square">
+            <a:spAutoFit/>
+          </a:bodyPr>
+          <a:lstStyle/>
+          <a:p>
+            <a:r>
+              <a:rPr lang="hr-HR" sz="1600" dirty="0"/>
+              <a:t>💡</a:t>
+            </a:r>
+            <a:r>
+              <a:rPr lang="hr-HR" sz="1600" b="1" dirty="0"/>
+              <a:t>querySelector() i querySelectorAll() </a:t>
+            </a:r>
+            <a:r>
+              <a:rPr lang="hr-HR" sz="1600" dirty="0"/>
+              <a:t>su najmoćniji jer mogu selektirati ID, klase i tagove istovremeno.</a:t>
+            </a:r>
+            <a:r>
+              <a:rPr lang="en-US" sz="1600" dirty="0"/>
+              <a:t> Ovo cete </a:t>
+            </a:r>
+            <a:r>
+              <a:rPr lang="en-US" sz="1600" dirty="0" err="1"/>
+              <a:t>cesce</a:t>
+            </a:r>
+            <a:r>
+              <a:rPr lang="en-US" sz="1600" dirty="0"/>
+              <a:t> </a:t>
+            </a:r>
+            <a:r>
+              <a:rPr lang="en-US" sz="1600" dirty="0" err="1"/>
+              <a:t>vidjati</a:t>
+            </a:r>
+            <a:r>
+              <a:rPr lang="en-US" sz="1600" dirty="0"/>
+              <a:t> u </a:t>
+            </a:r>
+            <a:r>
+              <a:rPr lang="en-US" sz="1600" dirty="0" err="1"/>
+              <a:t>kodu</a:t>
+            </a:r>
+            <a:r>
+              <a:rPr lang="en-US" sz="1600" dirty="0"/>
+              <a:t>. Puno </a:t>
+            </a:r>
+            <a:r>
+              <a:rPr lang="en-US" sz="1600" dirty="0" err="1"/>
+              <a:t>su</a:t>
+            </a:r>
+            <a:r>
+              <a:rPr lang="en-US" sz="1600" dirty="0"/>
+              <a:t> </a:t>
+            </a:r>
+            <a:r>
+              <a:rPr lang="en-US" sz="1600" dirty="0" err="1"/>
+              <a:t>mocniji</a:t>
+            </a:r>
+            <a:r>
+              <a:rPr lang="en-US" sz="1600" dirty="0"/>
+              <a:t> I </a:t>
+            </a:r>
+            <a:r>
+              <a:rPr lang="en-US" sz="1600" dirty="0" err="1"/>
+              <a:t>opsirnije</a:t>
+            </a:r>
+            <a:r>
+              <a:rPr lang="en-US" sz="1600" dirty="0"/>
+              <a:t> </a:t>
+            </a:r>
+            <a:r>
+              <a:rPr lang="en-US" sz="1600" dirty="0" err="1"/>
+              <a:t>nego</a:t>
+            </a:r>
+            <a:r>
+              <a:rPr lang="en-US" sz="1600" dirty="0"/>
+              <a:t> </a:t>
+            </a:r>
+            <a:r>
+              <a:rPr lang="en-US" sz="1600" dirty="0" err="1"/>
+              <a:t>getElements</a:t>
+            </a:r>
+            <a:r>
+              <a:rPr lang="en-US" sz="1600" dirty="0"/>
+              <a:t>()</a:t>
+            </a:r>
+          </a:p>
+        </p:txBody>
+      </p:sp>
+    </p:spTree>
+    <p:extLst>
+      <p:ext uri="{BB962C8B-B14F-4D97-AF65-F5344CB8AC3E}">
+        <p14:creationId xmlns:p14="http://schemas.microsoft.com/office/powerpoint/2010/main" val="2492456155"/>
       </p:ext>
     </p:extLst>
   </p:cSld>
@@ -28994,14 +29991,12 @@
 </file>
 
 <file path=customXml/item1.xml><?xml version="1.0" encoding="utf-8"?>
-<p:properties xmlns:p="http://schemas.microsoft.com/office/2006/metadata/properties" xmlns:xsi="http://www.w3.org/2001/XMLSchema-instance" xmlns:pc="http://schemas.microsoft.com/office/infopath/2007/PartnerControls">
-  <documentManagement>
-    <lcf76f155ced4ddcb4097134ff3c332f xmlns="40806f44-bc4a-4ea4-b660-c6da93f8f179">
-      <Terms xmlns="http://schemas.microsoft.com/office/infopath/2007/PartnerControls"/>
-    </lcf76f155ced4ddcb4097134ff3c332f>
-    <TaxCatchAll xmlns="758d0d8f-b783-4c78-ab73-9740c97b97cf" xsi:nil="true"/>
-  </documentManagement>
-</p:properties>
+<?mso-contentType ?>
+<FormTemplates xmlns="http://schemas.microsoft.com/sharepoint/v3/contenttype/forms">
+  <Display>DocumentLibraryForm</Display>
+  <Edit>DocumentLibraryForm</Edit>
+  <New>DocumentLibraryForm</New>
+</FormTemplates>
 </file>
 
 <file path=customXml/item2.xml><?xml version="1.0" encoding="utf-8"?>
@@ -29222,27 +30217,20 @@
 </file>
 
 <file path=customXml/item3.xml><?xml version="1.0" encoding="utf-8"?>
-<?mso-contentType ?>
-<FormTemplates xmlns="http://schemas.microsoft.com/sharepoint/v3/contenttype/forms">
-  <Display>DocumentLibraryForm</Display>
-  <Edit>DocumentLibraryForm</Edit>
-  <New>DocumentLibraryForm</New>
-</FormTemplates>
+<p:properties xmlns:p="http://schemas.microsoft.com/office/2006/metadata/properties" xmlns:xsi="http://www.w3.org/2001/XMLSchema-instance" xmlns:pc="http://schemas.microsoft.com/office/infopath/2007/PartnerControls">
+  <documentManagement>
+    <lcf76f155ced4ddcb4097134ff3c332f xmlns="40806f44-bc4a-4ea4-b660-c6da93f8f179">
+      <Terms xmlns="http://schemas.microsoft.com/office/infopath/2007/PartnerControls"/>
+    </lcf76f155ced4ddcb4097134ff3c332f>
+    <TaxCatchAll xmlns="758d0d8f-b783-4c78-ab73-9740c97b97cf" xsi:nil="true"/>
+  </documentManagement>
+</p:properties>
 </file>
 
 <file path=customXml/itemProps1.xml><?xml version="1.0" encoding="utf-8"?>
-<ds:datastoreItem xmlns:ds="http://schemas.openxmlformats.org/officeDocument/2006/customXml" ds:itemID="{61E72F81-8533-461E-8E71-A6D77294CFEF}">
+<ds:datastoreItem xmlns:ds="http://schemas.openxmlformats.org/officeDocument/2006/customXml" ds:itemID="{46915D30-CAA6-465E-907F-1770D4E3B01D}">
   <ds:schemaRefs>
-    <ds:schemaRef ds:uri="http://purl.org/dc/elements/1.1/"/>
-    <ds:schemaRef ds:uri="http://www.w3.org/XML/1998/namespace"/>
-    <ds:schemaRef ds:uri="http://purl.org/dc/terms/"/>
-    <ds:schemaRef ds:uri="http://schemas.microsoft.com/office/2006/documentManagement/types"/>
-    <ds:schemaRef ds:uri="40806f44-bc4a-4ea4-b660-c6da93f8f179"/>
-    <ds:schemaRef ds:uri="http://schemas.openxmlformats.org/package/2006/metadata/core-properties"/>
-    <ds:schemaRef ds:uri="http://purl.org/dc/dcmitype/"/>
-    <ds:schemaRef ds:uri="http://schemas.microsoft.com/office/infopath/2007/PartnerControls"/>
-    <ds:schemaRef ds:uri="758d0d8f-b783-4c78-ab73-9740c97b97cf"/>
-    <ds:schemaRef ds:uri="http://schemas.microsoft.com/office/2006/metadata/properties"/>
+    <ds:schemaRef ds:uri="http://schemas.microsoft.com/sharepoint/v3/contenttype/forms"/>
   </ds:schemaRefs>
 </ds:datastoreItem>
 </file>
@@ -29267,9 +30255,18 @@
 </file>
 
 <file path=customXml/itemProps3.xml><?xml version="1.0" encoding="utf-8"?>
-<ds:datastoreItem xmlns:ds="http://schemas.openxmlformats.org/officeDocument/2006/customXml" ds:itemID="{46915D30-CAA6-465E-907F-1770D4E3B01D}">
+<ds:datastoreItem xmlns:ds="http://schemas.openxmlformats.org/officeDocument/2006/customXml" ds:itemID="{61E72F81-8533-461E-8E71-A6D77294CFEF}">
   <ds:schemaRefs>
-    <ds:schemaRef ds:uri="http://schemas.microsoft.com/sharepoint/v3/contenttype/forms"/>
+    <ds:schemaRef ds:uri="http://purl.org/dc/elements/1.1/"/>
+    <ds:schemaRef ds:uri="http://www.w3.org/XML/1998/namespace"/>
+    <ds:schemaRef ds:uri="http://purl.org/dc/terms/"/>
+    <ds:schemaRef ds:uri="http://schemas.microsoft.com/office/2006/documentManagement/types"/>
+    <ds:schemaRef ds:uri="40806f44-bc4a-4ea4-b660-c6da93f8f179"/>
+    <ds:schemaRef ds:uri="http://schemas.openxmlformats.org/package/2006/metadata/core-properties"/>
+    <ds:schemaRef ds:uri="http://purl.org/dc/dcmitype/"/>
+    <ds:schemaRef ds:uri="http://schemas.microsoft.com/office/infopath/2007/PartnerControls"/>
+    <ds:schemaRef ds:uri="758d0d8f-b783-4c78-ab73-9740c97b97cf"/>
+    <ds:schemaRef ds:uri="http://schemas.microsoft.com/office/2006/metadata/properties"/>
   </ds:schemaRefs>
 </ds:datastoreItem>
 </file>
</xml_diff>

<commit_message>
finished javascript callbacks and started typescript
</commit_message>
<xml_diff>
--- a/Bootcamp/javascript-uvod/javascript-uvod.pptx
+++ b/Bootcamp/javascript-uvod/javascript-uvod.pptx
@@ -4980,6 +4980,94 @@
                 <a:latin typeface="Consolas" panose="020B0609020204030204" pitchFamily="49" charset="0"/>
               </a:rPr>
               <a:t>calculator(3, 4, multiply);</a:t>
+            </a:r>
+            <a:endParaRPr lang="en-US" b="0" dirty="0">
+              <a:solidFill>
+                <a:srgbClr val="D4D4D4"/>
+              </a:solidFill>
+              <a:effectLst/>
+              <a:latin typeface="Consolas" panose="020B0609020204030204" pitchFamily="49" charset="0"/>
+            </a:endParaRPr>
+          </a:p>
+          <a:p>
+            <a:pPr marL="0" marR="0" lvl="0" indent="0" algn="l" defTabSz="914400" rtl="0" eaLnBrk="1" fontAlgn="auto" latinLnBrk="0" hangingPunct="1">
+              <a:lnSpc>
+                <a:spcPct val="100000"/>
+              </a:lnSpc>
+              <a:spcBef>
+                <a:spcPts val="0"/>
+              </a:spcBef>
+              <a:spcAft>
+                <a:spcPts val="0"/>
+              </a:spcAft>
+              <a:buClrTx/>
+              <a:buSzTx/>
+              <a:buFontTx/>
+              <a:buNone/>
+              <a:tabLst/>
+              <a:defRPr/>
+            </a:pPr>
+            <a:endParaRPr lang="en-US" b="0" dirty="0">
+              <a:solidFill>
+                <a:srgbClr val="D4D4D4"/>
+              </a:solidFill>
+              <a:effectLst/>
+              <a:latin typeface="Consolas" panose="020B0609020204030204" pitchFamily="49" charset="0"/>
+            </a:endParaRPr>
+          </a:p>
+          <a:p>
+            <a:pPr marL="0" marR="0" lvl="0" indent="0" algn="l" defTabSz="914400" rtl="0" eaLnBrk="1" fontAlgn="auto" latinLnBrk="0" hangingPunct="1">
+              <a:lnSpc>
+                <a:spcPct val="100000"/>
+              </a:lnSpc>
+              <a:spcBef>
+                <a:spcPts val="0"/>
+              </a:spcBef>
+              <a:spcAft>
+                <a:spcPts val="0"/>
+              </a:spcAft>
+              <a:buClrTx/>
+              <a:buSzTx/>
+              <a:buFontTx/>
+              <a:buNone/>
+              <a:tabLst/>
+              <a:defRPr/>
+            </a:pPr>
+            <a:endParaRPr lang="en-US" b="0" dirty="0">
+              <a:solidFill>
+                <a:srgbClr val="D4D4D4"/>
+              </a:solidFill>
+              <a:effectLst/>
+              <a:latin typeface="Consolas" panose="020B0609020204030204" pitchFamily="49" charset="0"/>
+            </a:endParaRPr>
+          </a:p>
+          <a:p>
+            <a:pPr marL="0" marR="0" lvl="0" indent="0" algn="l" defTabSz="914400" rtl="0" eaLnBrk="1" fontAlgn="auto" latinLnBrk="0" hangingPunct="1">
+              <a:lnSpc>
+                <a:spcPct val="100000"/>
+              </a:lnSpc>
+              <a:spcBef>
+                <a:spcPts val="0"/>
+              </a:spcBef>
+              <a:spcAft>
+                <a:spcPts val="0"/>
+              </a:spcAft>
+              <a:buClrTx/>
+              <a:buSzTx/>
+              <a:buFontTx/>
+              <a:buNone/>
+              <a:tabLst/>
+              <a:defRPr/>
+            </a:pPr>
+            <a:r>
+              <a:rPr lang="en-US" b="0" dirty="0">
+                <a:solidFill>
+                  <a:srgbClr val="D4D4D4"/>
+                </a:solidFill>
+                <a:effectLst/>
+                <a:latin typeface="Consolas" panose="020B0609020204030204" pitchFamily="49" charset="0"/>
+              </a:rPr>
+              <a:t>eve</a:t>
             </a:r>
             <a:endParaRPr lang="hr-HR" dirty="0"/>
           </a:p>
@@ -26922,7 +27010,7 @@
         </p:nvSpPr>
         <p:spPr>
           <a:xfrm>
-            <a:off x="990600" y="383056"/>
+            <a:off x="990600" y="397686"/>
             <a:ext cx="10515600" cy="853976"/>
           </a:xfrm>
           <a:prstGeom prst="rect">
@@ -27378,7 +27466,7 @@
         </p:nvSpPr>
         <p:spPr>
           <a:xfrm>
-            <a:off x="990600" y="383056"/>
+            <a:off x="990600" y="390371"/>
             <a:ext cx="10515600" cy="853976"/>
           </a:xfrm>
           <a:prstGeom prst="rect">
@@ -30039,66 +30127,6 @@
           </a:p>
         </p:txBody>
       </p:sp>
-      <p:pic>
-        <p:nvPicPr>
-          <p:cNvPr id="3" name="Picture 2">
-            <a:extLst>
-              <a:ext uri="{FF2B5EF4-FFF2-40B4-BE49-F238E27FC236}">
-                <a16:creationId xmlns:a16="http://schemas.microsoft.com/office/drawing/2014/main" id="{A9D3DB85-C503-42FC-1631-C3DB7D7F9990}"/>
-              </a:ext>
-            </a:extLst>
-          </p:cNvPr>
-          <p:cNvPicPr>
-            <a:picLocks noChangeAspect="1"/>
-          </p:cNvPicPr>
-          <p:nvPr/>
-        </p:nvPicPr>
-        <p:blipFill>
-          <a:blip r:embed="rId3"/>
-          <a:stretch>
-            <a:fillRect/>
-          </a:stretch>
-        </p:blipFill>
-        <p:spPr>
-          <a:xfrm>
-            <a:off x="1142924" y="2013928"/>
-            <a:ext cx="5429250" cy="1762125"/>
-          </a:xfrm>
-          <a:prstGeom prst="rect">
-            <a:avLst/>
-          </a:prstGeom>
-        </p:spPr>
-      </p:pic>
-      <p:pic>
-        <p:nvPicPr>
-          <p:cNvPr id="6" name="Picture 5">
-            <a:extLst>
-              <a:ext uri="{FF2B5EF4-FFF2-40B4-BE49-F238E27FC236}">
-                <a16:creationId xmlns:a16="http://schemas.microsoft.com/office/drawing/2014/main" id="{E7ECDB34-4F29-2520-F5F6-01E2AC26235F}"/>
-              </a:ext>
-            </a:extLst>
-          </p:cNvPr>
-          <p:cNvPicPr>
-            <a:picLocks noChangeAspect="1"/>
-          </p:cNvPicPr>
-          <p:nvPr/>
-        </p:nvPicPr>
-        <p:blipFill>
-          <a:blip r:embed="rId4"/>
-          <a:stretch>
-            <a:fillRect/>
-          </a:stretch>
-        </p:blipFill>
-        <p:spPr>
-          <a:xfrm>
-            <a:off x="7324763" y="1378460"/>
-            <a:ext cx="4277145" cy="2691585"/>
-          </a:xfrm>
-          <a:prstGeom prst="rect">
-            <a:avLst/>
-          </a:prstGeom>
-        </p:spPr>
-      </p:pic>
       <p:sp>
         <p:nvSpPr>
           <p:cNvPr id="9" name="Title 1">
@@ -33264,6 +33292,17 @@
 </file>
 
 <file path=customXml/item1.xml><?xml version="1.0" encoding="utf-8"?>
+<p:properties xmlns:p="http://schemas.microsoft.com/office/2006/metadata/properties" xmlns:xsi="http://www.w3.org/2001/XMLSchema-instance" xmlns:pc="http://schemas.microsoft.com/office/infopath/2007/PartnerControls">
+  <documentManagement>
+    <lcf76f155ced4ddcb4097134ff3c332f xmlns="40806f44-bc4a-4ea4-b660-c6da93f8f179">
+      <Terms xmlns="http://schemas.microsoft.com/office/infopath/2007/PartnerControls"/>
+    </lcf76f155ced4ddcb4097134ff3c332f>
+    <TaxCatchAll xmlns="758d0d8f-b783-4c78-ab73-9740c97b97cf" xsi:nil="true"/>
+  </documentManagement>
+</p:properties>
+</file>
+
+<file path=customXml/item2.xml><?xml version="1.0" encoding="utf-8"?>
 <?mso-contentType ?>
 <FormTemplates xmlns="http://schemas.microsoft.com/sharepoint/v3/contenttype/forms">
   <Display>DocumentLibraryForm</Display>
@@ -33272,7 +33311,7 @@
 </FormTemplates>
 </file>
 
-<file path=customXml/item2.xml><?xml version="1.0" encoding="utf-8"?>
+<file path=customXml/item3.xml><?xml version="1.0" encoding="utf-8"?>
 <ct:contentTypeSchema xmlns:ct="http://schemas.microsoft.com/office/2006/metadata/contentType" xmlns:ma="http://schemas.microsoft.com/office/2006/metadata/properties/metaAttributes" ct:_="" ma:_="" ma:contentTypeName="Document" ma:contentTypeID="0x010100E4F55D9EF0BF0A44B819E681FCAC00B7" ma:contentTypeVersion="12" ma:contentTypeDescription="Create a new document." ma:contentTypeScope="" ma:versionID="068ce121a7a7a0aebcb89dd601c4f0a2">
   <xsd:schema xmlns:xsd="http://www.w3.org/2001/XMLSchema" xmlns:xs="http://www.w3.org/2001/XMLSchema" xmlns:p="http://schemas.microsoft.com/office/2006/metadata/properties" xmlns:ns2="40806f44-bc4a-4ea4-b660-c6da93f8f179" xmlns:ns3="758d0d8f-b783-4c78-ab73-9740c97b97cf" targetNamespace="http://schemas.microsoft.com/office/2006/metadata/properties" ma:root="true" ma:fieldsID="67c58e6c5c8ea9af0822acd84d25e1a2" ns2:_="" ns3:_="">
     <xsd:import namespace="40806f44-bc4a-4ea4-b660-c6da93f8f179"/>
@@ -33489,18 +33528,24 @@
 </ct:contentTypeSchema>
 </file>
 
-<file path=customXml/item3.xml><?xml version="1.0" encoding="utf-8"?>
-<p:properties xmlns:p="http://schemas.microsoft.com/office/2006/metadata/properties" xmlns:xsi="http://www.w3.org/2001/XMLSchema-instance" xmlns:pc="http://schemas.microsoft.com/office/infopath/2007/PartnerControls">
-  <documentManagement>
-    <lcf76f155ced4ddcb4097134ff3c332f xmlns="40806f44-bc4a-4ea4-b660-c6da93f8f179">
-      <Terms xmlns="http://schemas.microsoft.com/office/infopath/2007/PartnerControls"/>
-    </lcf76f155ced4ddcb4097134ff3c332f>
-    <TaxCatchAll xmlns="758d0d8f-b783-4c78-ab73-9740c97b97cf" xsi:nil="true"/>
-  </documentManagement>
-</p:properties>
+<file path=customXml/itemProps1.xml><?xml version="1.0" encoding="utf-8"?>
+<ds:datastoreItem xmlns:ds="http://schemas.openxmlformats.org/officeDocument/2006/customXml" ds:itemID="{61E72F81-8533-461E-8E71-A6D77294CFEF}">
+  <ds:schemaRefs>
+    <ds:schemaRef ds:uri="http://purl.org/dc/elements/1.1/"/>
+    <ds:schemaRef ds:uri="http://www.w3.org/XML/1998/namespace"/>
+    <ds:schemaRef ds:uri="http://purl.org/dc/terms/"/>
+    <ds:schemaRef ds:uri="http://schemas.microsoft.com/office/2006/documentManagement/types"/>
+    <ds:schemaRef ds:uri="40806f44-bc4a-4ea4-b660-c6da93f8f179"/>
+    <ds:schemaRef ds:uri="http://schemas.openxmlformats.org/package/2006/metadata/core-properties"/>
+    <ds:schemaRef ds:uri="http://purl.org/dc/dcmitype/"/>
+    <ds:schemaRef ds:uri="http://schemas.microsoft.com/office/infopath/2007/PartnerControls"/>
+    <ds:schemaRef ds:uri="758d0d8f-b783-4c78-ab73-9740c97b97cf"/>
+    <ds:schemaRef ds:uri="http://schemas.microsoft.com/office/2006/metadata/properties"/>
+  </ds:schemaRefs>
+</ds:datastoreItem>
 </file>
 
-<file path=customXml/itemProps1.xml><?xml version="1.0" encoding="utf-8"?>
+<file path=customXml/itemProps2.xml><?xml version="1.0" encoding="utf-8"?>
 <ds:datastoreItem xmlns:ds="http://schemas.openxmlformats.org/officeDocument/2006/customXml" ds:itemID="{46915D30-CAA6-465E-907F-1770D4E3B01D}">
   <ds:schemaRefs>
     <ds:schemaRef ds:uri="http://schemas.microsoft.com/sharepoint/v3/contenttype/forms"/>
@@ -33508,7 +33553,7 @@
 </ds:datastoreItem>
 </file>
 
-<file path=customXml/itemProps2.xml><?xml version="1.0" encoding="utf-8"?>
+<file path=customXml/itemProps3.xml><?xml version="1.0" encoding="utf-8"?>
 <ds:datastoreItem xmlns:ds="http://schemas.openxmlformats.org/officeDocument/2006/customXml" ds:itemID="{4E6AED0F-96FF-4C7F-8AC9-672C91BFCDFE}">
   <ds:schemaRefs>
     <ds:schemaRef ds:uri="http://schemas.microsoft.com/office/2006/metadata/contentType"/>
@@ -33525,21 +33570,4 @@
     <ds:schemaRef ds:uri="http://schemas.microsoft.com/internal/obd"/>
   </ds:schemaRefs>
 </ds:datastoreItem>
-</file>
-
-<file path=customXml/itemProps3.xml><?xml version="1.0" encoding="utf-8"?>
-<ds:datastoreItem xmlns:ds="http://schemas.openxmlformats.org/officeDocument/2006/customXml" ds:itemID="{61E72F81-8533-461E-8E71-A6D77294CFEF}">
-  <ds:schemaRefs>
-    <ds:schemaRef ds:uri="http://purl.org/dc/elements/1.1/"/>
-    <ds:schemaRef ds:uri="http://www.w3.org/XML/1998/namespace"/>
-    <ds:schemaRef ds:uri="http://purl.org/dc/terms/"/>
-    <ds:schemaRef ds:uri="http://schemas.microsoft.com/office/2006/documentManagement/types"/>
-    <ds:schemaRef ds:uri="40806f44-bc4a-4ea4-b660-c6da93f8f179"/>
-    <ds:schemaRef ds:uri="http://schemas.openxmlformats.org/package/2006/metadata/core-properties"/>
-    <ds:schemaRef ds:uri="http://purl.org/dc/dcmitype/"/>
-    <ds:schemaRef ds:uri="http://schemas.microsoft.com/office/infopath/2007/PartnerControls"/>
-    <ds:schemaRef ds:uri="758d0d8f-b783-4c78-ab73-9740c97b97cf"/>
-    <ds:schemaRef ds:uri="http://schemas.microsoft.com/office/2006/metadata/properties"/>
-  </ds:schemaRefs>
-</ds:datastoreItem>
 </file>
</xml_diff>